<commit_message>
Removing Versions from environment yml
</commit_message>
<xml_diff>
--- a/How I chose my house colors.pptx
+++ b/How I chose my house colors.pptx
@@ -115,7 +115,49 @@
       </a:defRPr>
     </a:lvl9pPr>
   </p:defaultTextStyle>
+  <p:extLst>
+    <p:ext uri="{EFAFB233-063F-42B5-8137-9DF3F51BA10A}">
+      <p15:sldGuideLst xmlns:p15="http://schemas.microsoft.com/office/powerpoint/2012/main"/>
+    </p:ext>
+  </p:extLst>
 </p:presentation>
+</file>
+
+<file path=ppt/revisionInfo.xml><?xml version="1.0" encoding="utf-8"?>
+<p1510:revInfo xmlns:a="http://schemas.openxmlformats.org/drawingml/2006/main" xmlns:r="http://schemas.openxmlformats.org/officeDocument/2006/relationships" xmlns:p1510="http://schemas.microsoft.com/office/powerpoint/2015/10/main">
+  <p1510:revLst>
+    <p1510:client id="{4CC95B79-535D-4986-91A5-2FFE61ECB9E7}" v="1" dt="2021-05-11T19:08:33.121"/>
+  </p1510:revLst>
+</p1510:revInfo>
+</file>
+
+<file path=ppt/changesInfos/changesInfo1.xml><?xml version="1.0" encoding="utf-8"?>
+<pc:chgInfo xmlns:a="http://schemas.openxmlformats.org/drawingml/2006/main" xmlns:r="http://schemas.openxmlformats.org/officeDocument/2006/relationships" xmlns:ac="http://schemas.microsoft.com/office/drawing/2013/main/command" xmlns:pc="http://schemas.microsoft.com/office/powerpoint/2013/main/command">
+  <pc:docChgLst>
+    <pc:chgData name="Sliter, Allison" userId="525088fa-9b98-49f1-b928-18fc15f7d5f2" providerId="ADAL" clId="{4CC95B79-535D-4986-91A5-2FFE61ECB9E7}"/>
+    <pc:docChg chg="modSld">
+      <pc:chgData name="Sliter, Allison" userId="525088fa-9b98-49f1-b928-18fc15f7d5f2" providerId="ADAL" clId="{4CC95B79-535D-4986-91A5-2FFE61ECB9E7}" dt="2021-05-11T19:08:33.119" v="0"/>
+      <pc:docMkLst>
+        <pc:docMk/>
+      </pc:docMkLst>
+      <pc:sldChg chg="modSp">
+        <pc:chgData name="Sliter, Allison" userId="525088fa-9b98-49f1-b928-18fc15f7d5f2" providerId="ADAL" clId="{4CC95B79-535D-4986-91A5-2FFE61ECB9E7}" dt="2021-05-11T19:08:33.119" v="0"/>
+        <pc:sldMkLst>
+          <pc:docMk/>
+          <pc:sldMk cId="325103381" sldId="265"/>
+        </pc:sldMkLst>
+        <pc:picChg chg="mod">
+          <ac:chgData name="Sliter, Allison" userId="525088fa-9b98-49f1-b928-18fc15f7d5f2" providerId="ADAL" clId="{4CC95B79-535D-4986-91A5-2FFE61ECB9E7}" dt="2021-05-11T19:08:33.119" v="0"/>
+          <ac:picMkLst>
+            <pc:docMk/>
+            <pc:sldMk cId="325103381" sldId="265"/>
+            <ac:picMk id="3" creationId="{A6CC5FF6-C637-44D6-9738-F8055D71229A}"/>
+          </ac:picMkLst>
+        </pc:picChg>
+      </pc:sldChg>
+    </pc:docChg>
+  </pc:docChgLst>
+</pc:chgInfo>
 </file>
 
 <file path=ppt/notesMasters/notesMaster1.xml><?xml version="1.0" encoding="utf-8"?>
@@ -200,7 +242,7 @@
           <a:p>
             <a:fld id="{A0B89706-A9D6-4027-9D65-81F90F60DB72}" type="datetimeFigureOut">
               <a:rPr lang="en-US" smtClean="0"/>
-              <a:t>5/10/2021</a:t>
+              <a:t>5/11/2021</a:t>
             </a:fld>
             <a:endParaRPr lang="en-US"/>
           </a:p>
@@ -798,7 +840,7 @@
           <a:p>
             <a:fld id="{3DA58FBC-6CC4-477A-B0AE-4A33E54C1283}" type="datetimeFigureOut">
               <a:rPr lang="en-US" smtClean="0"/>
-              <a:t>5/10/2021</a:t>
+              <a:t>5/11/2021</a:t>
             </a:fld>
             <a:endParaRPr lang="en-US"/>
           </a:p>
@@ -996,7 +1038,7 @@
           <a:p>
             <a:fld id="{3DA58FBC-6CC4-477A-B0AE-4A33E54C1283}" type="datetimeFigureOut">
               <a:rPr lang="en-US" smtClean="0"/>
-              <a:t>5/10/2021</a:t>
+              <a:t>5/11/2021</a:t>
             </a:fld>
             <a:endParaRPr lang="en-US"/>
           </a:p>
@@ -1204,7 +1246,7 @@
           <a:p>
             <a:fld id="{3DA58FBC-6CC4-477A-B0AE-4A33E54C1283}" type="datetimeFigureOut">
               <a:rPr lang="en-US" smtClean="0"/>
-              <a:t>5/10/2021</a:t>
+              <a:t>5/11/2021</a:t>
             </a:fld>
             <a:endParaRPr lang="en-US"/>
           </a:p>
@@ -1402,7 +1444,7 @@
           <a:p>
             <a:fld id="{3DA58FBC-6CC4-477A-B0AE-4A33E54C1283}" type="datetimeFigureOut">
               <a:rPr lang="en-US" smtClean="0"/>
-              <a:t>5/10/2021</a:t>
+              <a:t>5/11/2021</a:t>
             </a:fld>
             <a:endParaRPr lang="en-US"/>
           </a:p>
@@ -1677,7 +1719,7 @@
           <a:p>
             <a:fld id="{3DA58FBC-6CC4-477A-B0AE-4A33E54C1283}" type="datetimeFigureOut">
               <a:rPr lang="en-US" smtClean="0"/>
-              <a:t>5/10/2021</a:t>
+              <a:t>5/11/2021</a:t>
             </a:fld>
             <a:endParaRPr lang="en-US"/>
           </a:p>
@@ -1942,7 +1984,7 @@
           <a:p>
             <a:fld id="{3DA58FBC-6CC4-477A-B0AE-4A33E54C1283}" type="datetimeFigureOut">
               <a:rPr lang="en-US" smtClean="0"/>
-              <a:t>5/10/2021</a:t>
+              <a:t>5/11/2021</a:t>
             </a:fld>
             <a:endParaRPr lang="en-US"/>
           </a:p>
@@ -2354,7 +2396,7 @@
           <a:p>
             <a:fld id="{3DA58FBC-6CC4-477A-B0AE-4A33E54C1283}" type="datetimeFigureOut">
               <a:rPr lang="en-US" smtClean="0"/>
-              <a:t>5/10/2021</a:t>
+              <a:t>5/11/2021</a:t>
             </a:fld>
             <a:endParaRPr lang="en-US"/>
           </a:p>
@@ -2495,7 +2537,7 @@
           <a:p>
             <a:fld id="{3DA58FBC-6CC4-477A-B0AE-4A33E54C1283}" type="datetimeFigureOut">
               <a:rPr lang="en-US" smtClean="0"/>
-              <a:t>5/10/2021</a:t>
+              <a:t>5/11/2021</a:t>
             </a:fld>
             <a:endParaRPr lang="en-US"/>
           </a:p>
@@ -2608,7 +2650,7 @@
           <a:p>
             <a:fld id="{3DA58FBC-6CC4-477A-B0AE-4A33E54C1283}" type="datetimeFigureOut">
               <a:rPr lang="en-US" smtClean="0"/>
-              <a:t>5/10/2021</a:t>
+              <a:t>5/11/2021</a:t>
             </a:fld>
             <a:endParaRPr lang="en-US"/>
           </a:p>
@@ -2919,7 +2961,7 @@
           <a:p>
             <a:fld id="{3DA58FBC-6CC4-477A-B0AE-4A33E54C1283}" type="datetimeFigureOut">
               <a:rPr lang="en-US" smtClean="0"/>
-              <a:t>5/10/2021</a:t>
+              <a:t>5/11/2021</a:t>
             </a:fld>
             <a:endParaRPr lang="en-US"/>
           </a:p>
@@ -3207,7 +3249,7 @@
           <a:p>
             <a:fld id="{3DA58FBC-6CC4-477A-B0AE-4A33E54C1283}" type="datetimeFigureOut">
               <a:rPr lang="en-US" smtClean="0"/>
-              <a:t>5/10/2021</a:t>
+              <a:t>5/11/2021</a:t>
             </a:fld>
             <a:endParaRPr lang="en-US"/>
           </a:p>
@@ -3448,7 +3490,7 @@
           <a:p>
             <a:fld id="{3DA58FBC-6CC4-477A-B0AE-4A33E54C1283}" type="datetimeFigureOut">
               <a:rPr lang="en-US" smtClean="0"/>
-              <a:t>5/10/2021</a:t>
+              <a:t>5/11/2021</a:t>
             </a:fld>
             <a:endParaRPr lang="en-US"/>
           </a:p>
@@ -8046,6 +8088,7 @@
       <p:pic>
         <p:nvPicPr>
           <p:cNvPr id="3" name="Picture 2">
+            <a:hlinkClick r:id="rId3"/>
             <a:extLst>
               <a:ext uri="{FF2B5EF4-FFF2-40B4-BE49-F238E27FC236}">
                 <a16:creationId xmlns:a16="http://schemas.microsoft.com/office/drawing/2014/main" id="{A6CC5FF6-C637-44D6-9738-F8055D71229A}"/>
@@ -8058,7 +8101,7 @@
           <p:nvPr/>
         </p:nvPicPr>
         <p:blipFill>
-          <a:blip r:embed="rId3"/>
+          <a:blip r:embed="rId4"/>
           <a:stretch>
             <a:fillRect/>
           </a:stretch>

</xml_diff>